<commit_message>
added file with report
</commit_message>
<xml_diff>
--- a/Yakushev-IVTM1-24-streamlite-project.pptx
+++ b/Yakushev-IVTM1-24-streamlite-project.pptx
@@ -206,7 +206,7 @@
           <a:p>
             <a:fld id="{118E0483-793B-4401-865A-8307974159DB}" type="datetimeFigureOut">
               <a:rPr lang="ru-RU" smtClean="0"/>
-              <a:t>26.12.2024</a:t>
+              <a:t>09.01.2025</a:t>
             </a:fld>
             <a:endParaRPr lang="ru-RU"/>
           </a:p>
@@ -620,7 +620,7 @@
           <a:p>
             <a:fld id="{85FFCB9A-AB07-414D-B5B4-770EA6F63619}" type="datetimeFigureOut">
               <a:rPr lang="ru-RU" smtClean="0"/>
-              <a:t>26.12.2024</a:t>
+              <a:t>09.01.2025</a:t>
             </a:fld>
             <a:endParaRPr lang="ru-RU"/>
           </a:p>
@@ -818,7 +818,7 @@
           <a:p>
             <a:fld id="{85FFCB9A-AB07-414D-B5B4-770EA6F63619}" type="datetimeFigureOut">
               <a:rPr lang="ru-RU" smtClean="0"/>
-              <a:t>26.12.2024</a:t>
+              <a:t>09.01.2025</a:t>
             </a:fld>
             <a:endParaRPr lang="ru-RU"/>
           </a:p>
@@ -1026,7 +1026,7 @@
           <a:p>
             <a:fld id="{85FFCB9A-AB07-414D-B5B4-770EA6F63619}" type="datetimeFigureOut">
               <a:rPr lang="ru-RU" smtClean="0"/>
-              <a:t>26.12.2024</a:t>
+              <a:t>09.01.2025</a:t>
             </a:fld>
             <a:endParaRPr lang="ru-RU"/>
           </a:p>
@@ -1224,7 +1224,7 @@
           <a:p>
             <a:fld id="{85FFCB9A-AB07-414D-B5B4-770EA6F63619}" type="datetimeFigureOut">
               <a:rPr lang="ru-RU" smtClean="0"/>
-              <a:t>26.12.2024</a:t>
+              <a:t>09.01.2025</a:t>
             </a:fld>
             <a:endParaRPr lang="ru-RU"/>
           </a:p>
@@ -1499,7 +1499,7 @@
           <a:p>
             <a:fld id="{85FFCB9A-AB07-414D-B5B4-770EA6F63619}" type="datetimeFigureOut">
               <a:rPr lang="ru-RU" smtClean="0"/>
-              <a:t>26.12.2024</a:t>
+              <a:t>09.01.2025</a:t>
             </a:fld>
             <a:endParaRPr lang="ru-RU"/>
           </a:p>
@@ -1764,7 +1764,7 @@
           <a:p>
             <a:fld id="{85FFCB9A-AB07-414D-B5B4-770EA6F63619}" type="datetimeFigureOut">
               <a:rPr lang="ru-RU" smtClean="0"/>
-              <a:t>26.12.2024</a:t>
+              <a:t>09.01.2025</a:t>
             </a:fld>
             <a:endParaRPr lang="ru-RU"/>
           </a:p>
@@ -2176,7 +2176,7 @@
           <a:p>
             <a:fld id="{85FFCB9A-AB07-414D-B5B4-770EA6F63619}" type="datetimeFigureOut">
               <a:rPr lang="ru-RU" smtClean="0"/>
-              <a:t>26.12.2024</a:t>
+              <a:t>09.01.2025</a:t>
             </a:fld>
             <a:endParaRPr lang="ru-RU"/>
           </a:p>
@@ -2317,7 +2317,7 @@
           <a:p>
             <a:fld id="{85FFCB9A-AB07-414D-B5B4-770EA6F63619}" type="datetimeFigureOut">
               <a:rPr lang="ru-RU" smtClean="0"/>
-              <a:t>26.12.2024</a:t>
+              <a:t>09.01.2025</a:t>
             </a:fld>
             <a:endParaRPr lang="ru-RU"/>
           </a:p>
@@ -2430,7 +2430,7 @@
           <a:p>
             <a:fld id="{85FFCB9A-AB07-414D-B5B4-770EA6F63619}" type="datetimeFigureOut">
               <a:rPr lang="ru-RU" smtClean="0"/>
-              <a:t>26.12.2024</a:t>
+              <a:t>09.01.2025</a:t>
             </a:fld>
             <a:endParaRPr lang="ru-RU"/>
           </a:p>
@@ -2741,7 +2741,7 @@
           <a:p>
             <a:fld id="{85FFCB9A-AB07-414D-B5B4-770EA6F63619}" type="datetimeFigureOut">
               <a:rPr lang="ru-RU" smtClean="0"/>
-              <a:t>26.12.2024</a:t>
+              <a:t>09.01.2025</a:t>
             </a:fld>
             <a:endParaRPr lang="ru-RU"/>
           </a:p>
@@ -3029,7 +3029,7 @@
           <a:p>
             <a:fld id="{85FFCB9A-AB07-414D-B5B4-770EA6F63619}" type="datetimeFigureOut">
               <a:rPr lang="ru-RU" smtClean="0"/>
-              <a:t>26.12.2024</a:t>
+              <a:t>09.01.2025</a:t>
             </a:fld>
             <a:endParaRPr lang="ru-RU"/>
           </a:p>
@@ -3270,7 +3270,7 @@
           <a:p>
             <a:fld id="{85FFCB9A-AB07-414D-B5B4-770EA6F63619}" type="datetimeFigureOut">
               <a:rPr lang="ru-RU" smtClean="0"/>
-              <a:t>26.12.2024</a:t>
+              <a:t>09.01.2025</a:t>
             </a:fld>
             <a:endParaRPr lang="ru-RU"/>
           </a:p>
@@ -6257,96 +6257,19 @@
       </p:sp>
       <p:sp>
         <p:nvSpPr>
-          <p:cNvPr id="7" name="Прямоугольник 6">
-            <a:extLst>
-              <a:ext uri="{FF2B5EF4-FFF2-40B4-BE49-F238E27FC236}">
-                <a16:creationId xmlns:a16="http://schemas.microsoft.com/office/drawing/2014/main" id="{4D44A65F-E188-4968-B07C-25421CD26538}"/>
-              </a:ext>
-            </a:extLst>
-          </p:cNvPr>
-          <p:cNvSpPr/>
+          <p:cNvPr id="2" name="TextBox 1">
+            <a:extLst>
+              <a:ext uri="{FF2B5EF4-FFF2-40B4-BE49-F238E27FC236}">
+                <a16:creationId xmlns:a16="http://schemas.microsoft.com/office/drawing/2014/main" id="{F919A0E8-D1C2-AD08-458D-D52F2FFC2BD0}"/>
+              </a:ext>
+            </a:extLst>
+          </p:cNvPr>
+          <p:cNvSpPr txBox="1"/>
           <p:nvPr/>
         </p:nvSpPr>
         <p:spPr>
           <a:xfrm>
-            <a:off x="500283" y="1230294"/>
-            <a:ext cx="10968905" cy="646331"/>
-          </a:xfrm>
-          <a:prstGeom prst="rect">
-            <a:avLst/>
-          </a:prstGeom>
-        </p:spPr>
-        <p:txBody>
-          <a:bodyPr wrap="square">
-            <a:spAutoFit/>
-          </a:bodyPr>
-          <a:lstStyle/>
-          <a:p>
-            <a:pPr marL="12700" lvl="1" algn="just" fontAlgn="base">
-              <a:lnSpc>
-                <a:spcPct val="90000"/>
-              </a:lnSpc>
-            </a:pPr>
-            <a:r>
-              <a:rPr lang="ru-RU" sz="2000" dirty="0">
-                <a:latin typeface="+mn-lt"/>
-                <a:ea typeface="Verdana" panose="020B0604030504040204" pitchFamily="34" charset="0"/>
-                <a:cs typeface="Verdana" panose="020B0604030504040204" pitchFamily="34" charset="0"/>
-              </a:rPr>
-              <a:t>Описываются тесты/</a:t>
-            </a:r>
-            <a:r>
-              <a:rPr lang="en-US" sz="2000" dirty="0">
-                <a:latin typeface="+mn-lt"/>
-                <a:ea typeface="Verdana" panose="020B0604030504040204" pitchFamily="34" charset="0"/>
-                <a:cs typeface="Verdana" panose="020B0604030504040204" pitchFamily="34" charset="0"/>
-              </a:rPr>
-              <a:t>CI/</a:t>
-            </a:r>
-            <a:r>
-              <a:rPr lang="ru-RU" sz="2000" dirty="0">
-                <a:ea typeface="Verdana" panose="020B0604030504040204" pitchFamily="34" charset="0"/>
-                <a:cs typeface="Verdana" panose="020B0604030504040204" pitchFamily="34" charset="0"/>
-              </a:rPr>
-              <a:t>процесс развертывания в облаке (</a:t>
-            </a:r>
-            <a:r>
-              <a:rPr lang="ru-RU" sz="2000" i="1" dirty="0">
-                <a:ea typeface="Verdana" panose="020B0604030504040204" pitchFamily="34" charset="0"/>
-                <a:cs typeface="Verdana" panose="020B0604030504040204" pitchFamily="34" charset="0"/>
-              </a:rPr>
-              <a:t>не обязательно все, а только то, что реально сделано</a:t>
-            </a:r>
-            <a:r>
-              <a:rPr lang="ru-RU" sz="2000" dirty="0">
-                <a:ea typeface="Verdana" panose="020B0604030504040204" pitchFamily="34" charset="0"/>
-                <a:cs typeface="Verdana" panose="020B0604030504040204" pitchFamily="34" charset="0"/>
-              </a:rPr>
-              <a:t>)</a:t>
-            </a:r>
-            <a:endParaRPr lang="ru-RU" sz="2000" dirty="0">
-              <a:latin typeface="+mn-lt"/>
-              <a:ea typeface="Verdana" panose="020B0604030504040204" pitchFamily="34" charset="0"/>
-              <a:cs typeface="Verdana" panose="020B0604030504040204" pitchFamily="34" charset="0"/>
-            </a:endParaRPr>
-          </a:p>
-        </p:txBody>
-      </p:sp>
-      <p:sp>
-        <p:nvSpPr>
-          <p:cNvPr id="2" name="TextBox 1">
-            <a:extLst>
-              <a:ext uri="{FF2B5EF4-FFF2-40B4-BE49-F238E27FC236}">
-                <a16:creationId xmlns:a16="http://schemas.microsoft.com/office/drawing/2014/main" id="{F919A0E8-D1C2-AD08-458D-D52F2FFC2BD0}"/>
-              </a:ext>
-            </a:extLst>
-          </p:cNvPr>
-          <p:cNvSpPr txBox="1"/>
-          <p:nvPr/>
-        </p:nvSpPr>
-        <p:spPr>
-          <a:xfrm>
-            <a:off x="569933" y="2079321"/>
+            <a:off x="569933" y="1418067"/>
             <a:ext cx="9707671" cy="2031325"/>
           </a:xfrm>
           <a:prstGeom prst="rect">
@@ -6454,7 +6377,7 @@
         </p:blipFill>
         <p:spPr>
           <a:xfrm>
-            <a:off x="569933" y="3582370"/>
+            <a:off x="569933" y="3236231"/>
             <a:ext cx="10452970" cy="1056551"/>
           </a:xfrm>
           <a:prstGeom prst="rect">
@@ -6476,7 +6399,7 @@
         </p:nvSpPr>
         <p:spPr>
           <a:xfrm>
-            <a:off x="500283" y="4782878"/>
+            <a:off x="569932" y="4516603"/>
             <a:ext cx="9707671" cy="1846659"/>
           </a:xfrm>
           <a:prstGeom prst="rect">

</xml_diff>